<commit_message>
Update 2 Tir 98
</commit_message>
<xml_diff>
--- a/Artifitial Inteligence/slides/Perceptrons.pptx
+++ b/Artifitial Inteligence/slides/Perceptrons.pptx
@@ -5,10 +5,10 @@
     <p:sldMasterId id="2147483829" r:id="rId1"/>
   </p:sldMasterIdLst>
   <p:notesMasterIdLst>
-    <p:notesMasterId r:id="rId29"/>
+    <p:notesMasterId r:id="rId30"/>
   </p:notesMasterIdLst>
   <p:handoutMasterIdLst>
-    <p:handoutMasterId r:id="rId30"/>
+    <p:handoutMasterId r:id="rId31"/>
   </p:handoutMasterIdLst>
   <p:sldIdLst>
     <p:sldId id="570" r:id="rId2"/>
@@ -26,23 +26,24 @@
     <p:sldId id="520" r:id="rId14"/>
     <p:sldId id="580" r:id="rId15"/>
     <p:sldId id="568" r:id="rId16"/>
-    <p:sldId id="521" r:id="rId17"/>
-    <p:sldId id="522" r:id="rId18"/>
-    <p:sldId id="523" r:id="rId19"/>
-    <p:sldId id="525" r:id="rId20"/>
-    <p:sldId id="526" r:id="rId21"/>
-    <p:sldId id="576" r:id="rId22"/>
-    <p:sldId id="527" r:id="rId23"/>
-    <p:sldId id="554" r:id="rId24"/>
-    <p:sldId id="473" r:id="rId25"/>
-    <p:sldId id="474" r:id="rId26"/>
-    <p:sldId id="475" r:id="rId27"/>
-    <p:sldId id="476" r:id="rId28"/>
+    <p:sldId id="581" r:id="rId17"/>
+    <p:sldId id="521" r:id="rId18"/>
+    <p:sldId id="522" r:id="rId19"/>
+    <p:sldId id="523" r:id="rId20"/>
+    <p:sldId id="525" r:id="rId21"/>
+    <p:sldId id="526" r:id="rId22"/>
+    <p:sldId id="576" r:id="rId23"/>
+    <p:sldId id="527" r:id="rId24"/>
+    <p:sldId id="554" r:id="rId25"/>
+    <p:sldId id="473" r:id="rId26"/>
+    <p:sldId id="474" r:id="rId27"/>
+    <p:sldId id="475" r:id="rId28"/>
+    <p:sldId id="476" r:id="rId29"/>
   </p:sldIdLst>
   <p:sldSz cx="12192000" cy="6858000"/>
   <p:notesSz cx="7099300" cy="10234613"/>
   <p:custDataLst>
-    <p:tags r:id="rId31"/>
+    <p:tags r:id="rId32"/>
   </p:custDataLst>
   <p:defaultTextStyle>
     <a:defPPr>
@@ -1090,7 +1091,7 @@
             <a:fld id="{8957F51E-A783-406E-B590-1245D7CA094A}" type="slidenum">
               <a:rPr lang="en-US" smtClean="0"/>
               <a:pPr defTabSz="965200"/>
-              <a:t>26</a:t>
+              <a:t>27</a:t>
             </a:fld>
             <a:endParaRPr lang="en-US"/>
           </a:p>
@@ -7555,17 +7556,23 @@
           <p:cNvGraphicFramePr>
             <a:graphicFrameLocks noChangeAspect="1"/>
           </p:cNvGraphicFramePr>
-          <p:nvPr/>
+          <p:nvPr>
+            <p:extLst>
+              <p:ext uri="{D42A27DB-BD31-4B8C-83A1-F6EECF244321}">
+                <p14:modId xmlns:p14="http://schemas.microsoft.com/office/powerpoint/2010/main" val="3045813282"/>
+              </p:ext>
+            </p:extLst>
+          </p:nvPr>
         </p:nvGraphicFramePr>
         <p:xfrm>
-          <a:off x="3636963" y="2078038"/>
-          <a:ext cx="4791075" cy="3743325"/>
+          <a:off x="5996115" y="3067649"/>
+          <a:ext cx="2886353" cy="2255143"/>
         </p:xfrm>
         <a:graphic>
           <a:graphicData uri="http://schemas.openxmlformats.org/presentationml/2006/ole">
             <mc:AlternateContent xmlns:mc="http://schemas.openxmlformats.org/markup-compatibility/2006">
               <mc:Choice xmlns:v="urn:schemas-microsoft-com:vml" Requires="v">
-                <p:oleObj spid="_x0000_s1025" name="Photo Editor Photo" r:id="rId3" imgW="4791744" imgH="3742857" progId="MSPhotoEd.3">
+                <p:oleObj spid="_x0000_s1047" name="Photo Editor Photo" r:id="rId3" imgW="4791744" imgH="3742857" progId="MSPhotoEd.3">
                   <p:embed/>
                 </p:oleObj>
               </mc:Choice>
@@ -7605,8 +7612,8 @@
                     </p:blipFill>
                     <p:spPr bwMode="auto">
                       <a:xfrm>
-                        <a:off x="3636963" y="2078038"/>
-                        <a:ext cx="4791075" cy="3743325"/>
+                        <a:off x="5996115" y="3067649"/>
+                        <a:ext cx="2886353" cy="2255143"/>
                       </a:xfrm>
                       <a:prstGeom prst="rect">
                         <a:avLst/>
@@ -7616,34 +7623,6 @@
                         <a:noFill/>
                       </a:ln>
                       <a:effectLst/>
-                      <a:extLst>
-                        <a:ext uri="{909E8E84-426E-40DD-AFC4-6F175D3DCCD1}">
-                          <a14:hiddenFill xmlns:a14="http://schemas.microsoft.com/office/drawing/2010/main">
-                            <a:solidFill>
-                              <a:schemeClr val="accent1"/>
-                            </a:solidFill>
-                          </a14:hiddenFill>
-                        </a:ext>
-                        <a:ext uri="{91240B29-F687-4F45-9708-019B960494DF}">
-                          <a14:hiddenLine xmlns:a14="http://schemas.microsoft.com/office/drawing/2010/main" w="19050">
-                            <a:solidFill>
-                              <a:schemeClr val="tx1"/>
-                            </a:solidFill>
-                            <a:miter lim="800000"/>
-                            <a:headEnd/>
-                            <a:tailEnd/>
-                          </a14:hiddenLine>
-                        </a:ext>
-                        <a:ext uri="{AF507438-7753-43E0-B8FC-AC1667EBCBE1}">
-                          <a14:hiddenEffects xmlns:a14="http://schemas.microsoft.com/office/drawing/2010/main">
-                            <a:effectLst>
-                              <a:outerShdw dist="35921" dir="2700000" algn="ctr" rotWithShape="0">
-                                <a:schemeClr val="bg2"/>
-                              </a:outerShdw>
-                            </a:effectLst>
-                          </a14:hiddenEffects>
-                        </a:ext>
-                      </a:extLst>
                     </p:spPr>
                   </p:pic>
                 </p:oleObj>
@@ -7658,17 +7637,23 @@
           <p:cNvGraphicFramePr>
             <a:graphicFrameLocks noChangeAspect="1"/>
           </p:cNvGraphicFramePr>
-          <p:nvPr/>
+          <p:nvPr>
+            <p:extLst>
+              <p:ext uri="{D42A27DB-BD31-4B8C-83A1-F6EECF244321}">
+                <p14:modId xmlns:p14="http://schemas.microsoft.com/office/powerpoint/2010/main" val="1583926386"/>
+              </p:ext>
+            </p:extLst>
+          </p:nvPr>
         </p:nvGraphicFramePr>
         <p:xfrm>
-          <a:off x="3681413" y="2095500"/>
-          <a:ext cx="4752975" cy="3705225"/>
+          <a:off x="3662862" y="1333699"/>
+          <a:ext cx="2601414" cy="2027956"/>
         </p:xfrm>
         <a:graphic>
           <a:graphicData uri="http://schemas.openxmlformats.org/presentationml/2006/ole">
             <mc:AlternateContent xmlns:mc="http://schemas.openxmlformats.org/markup-compatibility/2006">
               <mc:Choice xmlns:v="urn:schemas-microsoft-com:vml" Requires="v">
-                <p:oleObj spid="_x0000_s1026" name="Photo Editor Photo" r:id="rId5" imgW="4753639" imgH="3704762" progId="MSPhotoEd.3">
+                <p:oleObj spid="_x0000_s1048" name="Photo Editor Photo" r:id="rId5" imgW="4753639" imgH="3704762" progId="MSPhotoEd.3">
                   <p:embed/>
                 </p:oleObj>
               </mc:Choice>
@@ -7708,8 +7693,8 @@
                     </p:blipFill>
                     <p:spPr bwMode="auto">
                       <a:xfrm>
-                        <a:off x="3681413" y="2095500"/>
-                        <a:ext cx="4752975" cy="3705225"/>
+                        <a:off x="3662862" y="1333699"/>
+                        <a:ext cx="2601414" cy="2027956"/>
                       </a:xfrm>
                       <a:prstGeom prst="rect">
                         <a:avLst/>
@@ -7719,34 +7704,6 @@
                         <a:noFill/>
                       </a:ln>
                       <a:effectLst/>
-                      <a:extLst>
-                        <a:ext uri="{909E8E84-426E-40DD-AFC4-6F175D3DCCD1}">
-                          <a14:hiddenFill xmlns:a14="http://schemas.microsoft.com/office/drawing/2010/main">
-                            <a:solidFill>
-                              <a:schemeClr val="accent1"/>
-                            </a:solidFill>
-                          </a14:hiddenFill>
-                        </a:ext>
-                        <a:ext uri="{91240B29-F687-4F45-9708-019B960494DF}">
-                          <a14:hiddenLine xmlns:a14="http://schemas.microsoft.com/office/drawing/2010/main" w="19050">
-                            <a:solidFill>
-                              <a:schemeClr val="tx1"/>
-                            </a:solidFill>
-                            <a:miter lim="800000"/>
-                            <a:headEnd/>
-                            <a:tailEnd/>
-                          </a14:hiddenLine>
-                        </a:ext>
-                        <a:ext uri="{AF507438-7753-43E0-B8FC-AC1667EBCBE1}">
-                          <a14:hiddenEffects xmlns:a14="http://schemas.microsoft.com/office/drawing/2010/main">
-                            <a:effectLst>
-                              <a:outerShdw dist="35921" dir="2700000" algn="ctr" rotWithShape="0">
-                                <a:schemeClr val="bg2"/>
-                              </a:outerShdw>
-                            </a:effectLst>
-                          </a14:hiddenEffects>
-                        </a:ext>
-                      </a:extLst>
                     </p:spPr>
                   </p:pic>
                 </p:oleObj>
@@ -7761,17 +7718,23 @@
           <p:cNvGraphicFramePr>
             <a:graphicFrameLocks noChangeAspect="1"/>
           </p:cNvGraphicFramePr>
-          <p:nvPr/>
+          <p:nvPr>
+            <p:extLst>
+              <p:ext uri="{D42A27DB-BD31-4B8C-83A1-F6EECF244321}">
+                <p14:modId xmlns:p14="http://schemas.microsoft.com/office/powerpoint/2010/main" val="1374464817"/>
+              </p:ext>
+            </p:extLst>
+          </p:nvPr>
         </p:nvGraphicFramePr>
         <p:xfrm>
-          <a:off x="3648075" y="2066925"/>
-          <a:ext cx="4752975" cy="3781425"/>
+          <a:off x="4800600" y="5189519"/>
+          <a:ext cx="1748615" cy="1391182"/>
         </p:xfrm>
         <a:graphic>
           <a:graphicData uri="http://schemas.openxmlformats.org/presentationml/2006/ole">
             <mc:AlternateContent xmlns:mc="http://schemas.openxmlformats.org/markup-compatibility/2006">
               <mc:Choice xmlns:v="urn:schemas-microsoft-com:vml" Requires="v">
-                <p:oleObj spid="_x0000_s1027" name="Photo Editor Photo" r:id="rId7" imgW="4753639" imgH="3780952" progId="MSPhotoEd.3">
+                <p:oleObj spid="_x0000_s1049" name="Photo Editor Photo" r:id="rId7" imgW="4753639" imgH="3780952" progId="MSPhotoEd.3">
                   <p:embed/>
                 </p:oleObj>
               </mc:Choice>
@@ -7811,8 +7774,8 @@
                     </p:blipFill>
                     <p:spPr bwMode="auto">
                       <a:xfrm>
-                        <a:off x="3648075" y="2066925"/>
-                        <a:ext cx="4752975" cy="3781425"/>
+                        <a:off x="4800600" y="5189519"/>
+                        <a:ext cx="1748615" cy="1391182"/>
                       </a:xfrm>
                       <a:prstGeom prst="rect">
                         <a:avLst/>
@@ -7822,34 +7785,6 @@
                         <a:noFill/>
                       </a:ln>
                       <a:effectLst/>
-                      <a:extLst>
-                        <a:ext uri="{909E8E84-426E-40DD-AFC4-6F175D3DCCD1}">
-                          <a14:hiddenFill xmlns:a14="http://schemas.microsoft.com/office/drawing/2010/main">
-                            <a:solidFill>
-                              <a:schemeClr val="accent1"/>
-                            </a:solidFill>
-                          </a14:hiddenFill>
-                        </a:ext>
-                        <a:ext uri="{91240B29-F687-4F45-9708-019B960494DF}">
-                          <a14:hiddenLine xmlns:a14="http://schemas.microsoft.com/office/drawing/2010/main" w="19050">
-                            <a:solidFill>
-                              <a:schemeClr val="tx1"/>
-                            </a:solidFill>
-                            <a:miter lim="800000"/>
-                            <a:headEnd/>
-                            <a:tailEnd/>
-                          </a14:hiddenLine>
-                        </a:ext>
-                        <a:ext uri="{AF507438-7753-43E0-B8FC-AC1667EBCBE1}">
-                          <a14:hiddenEffects xmlns:a14="http://schemas.microsoft.com/office/drawing/2010/main">
-                            <a:effectLst>
-                              <a:outerShdw dist="35921" dir="2700000" algn="ctr" rotWithShape="0">
-                                <a:schemeClr val="bg2"/>
-                              </a:outerShdw>
-                            </a:effectLst>
-                          </a14:hiddenEffects>
-                        </a:ext>
-                      </a:extLst>
                     </p:spPr>
                   </p:pic>
                 </p:oleObj>
@@ -7864,17 +7799,23 @@
           <p:cNvGraphicFramePr>
             <a:graphicFrameLocks noChangeAspect="1"/>
           </p:cNvGraphicFramePr>
-          <p:nvPr/>
+          <p:nvPr>
+            <p:extLst>
+              <p:ext uri="{D42A27DB-BD31-4B8C-83A1-F6EECF244321}">
+                <p14:modId xmlns:p14="http://schemas.microsoft.com/office/powerpoint/2010/main" val="1423336557"/>
+              </p:ext>
+            </p:extLst>
+          </p:nvPr>
         </p:nvGraphicFramePr>
         <p:xfrm>
-          <a:off x="3552825" y="2101850"/>
-          <a:ext cx="4905375" cy="3762375"/>
+          <a:off x="435120" y="1911736"/>
+          <a:ext cx="2653604" cy="2035289"/>
         </p:xfrm>
         <a:graphic>
           <a:graphicData uri="http://schemas.openxmlformats.org/presentationml/2006/ole">
             <mc:AlternateContent xmlns:mc="http://schemas.openxmlformats.org/markup-compatibility/2006">
               <mc:Choice xmlns:v="urn:schemas-microsoft-com:vml" Requires="v">
-                <p:oleObj spid="_x0000_s1028" name="Photo Editor Photo" r:id="rId9" imgW="4904762" imgH="3761905" progId="MSPhotoEd.3">
+                <p:oleObj spid="_x0000_s1050" name="Photo Editor Photo" r:id="rId9" imgW="4904762" imgH="3761905" progId="MSPhotoEd.3">
                   <p:embed/>
                 </p:oleObj>
               </mc:Choice>
@@ -7914,8 +7855,8 @@
                     </p:blipFill>
                     <p:spPr bwMode="auto">
                       <a:xfrm>
-                        <a:off x="3552825" y="2101850"/>
-                        <a:ext cx="4905375" cy="3762375"/>
+                        <a:off x="435120" y="1911736"/>
+                        <a:ext cx="2653604" cy="2035289"/>
                       </a:xfrm>
                       <a:prstGeom prst="rect">
                         <a:avLst/>
@@ -7925,34 +7866,6 @@
                         <a:noFill/>
                       </a:ln>
                       <a:effectLst/>
-                      <a:extLst>
-                        <a:ext uri="{909E8E84-426E-40DD-AFC4-6F175D3DCCD1}">
-                          <a14:hiddenFill xmlns:a14="http://schemas.microsoft.com/office/drawing/2010/main">
-                            <a:solidFill>
-                              <a:schemeClr val="accent1"/>
-                            </a:solidFill>
-                          </a14:hiddenFill>
-                        </a:ext>
-                        <a:ext uri="{91240B29-F687-4F45-9708-019B960494DF}">
-                          <a14:hiddenLine xmlns:a14="http://schemas.microsoft.com/office/drawing/2010/main" w="19050">
-                            <a:solidFill>
-                              <a:schemeClr val="tx1"/>
-                            </a:solidFill>
-                            <a:miter lim="800000"/>
-                            <a:headEnd/>
-                            <a:tailEnd/>
-                          </a14:hiddenLine>
-                        </a:ext>
-                        <a:ext uri="{AF507438-7753-43E0-B8FC-AC1667EBCBE1}">
-                          <a14:hiddenEffects xmlns:a14="http://schemas.microsoft.com/office/drawing/2010/main">
-                            <a:effectLst>
-                              <a:outerShdw dist="35921" dir="2700000" algn="ctr" rotWithShape="0">
-                                <a:schemeClr val="bg2"/>
-                              </a:outerShdw>
-                            </a:effectLst>
-                          </a14:hiddenEffects>
-                        </a:ext>
-                      </a:extLst>
                     </p:spPr>
                   </p:pic>
                 </p:oleObj>
@@ -7967,17 +7880,23 @@
           <p:cNvGraphicFramePr>
             <a:graphicFrameLocks noChangeAspect="1"/>
           </p:cNvGraphicFramePr>
-          <p:nvPr/>
+          <p:nvPr>
+            <p:extLst>
+              <p:ext uri="{D42A27DB-BD31-4B8C-83A1-F6EECF244321}">
+                <p14:modId xmlns:p14="http://schemas.microsoft.com/office/powerpoint/2010/main" val="3362848566"/>
+              </p:ext>
+            </p:extLst>
+          </p:nvPr>
         </p:nvGraphicFramePr>
         <p:xfrm>
-          <a:off x="3509963" y="2095500"/>
-          <a:ext cx="4943475" cy="3743325"/>
+          <a:off x="9144000" y="1213231"/>
+          <a:ext cx="2431656" cy="1841312"/>
         </p:xfrm>
         <a:graphic>
           <a:graphicData uri="http://schemas.openxmlformats.org/presentationml/2006/ole">
             <mc:AlternateContent xmlns:mc="http://schemas.openxmlformats.org/markup-compatibility/2006">
               <mc:Choice xmlns:v="urn:schemas-microsoft-com:vml" Requires="v">
-                <p:oleObj spid="_x0000_s1029" name="Photo Editor Photo" r:id="rId11" imgW="4944165" imgH="3742857" progId="MSPhotoEd.3">
+                <p:oleObj spid="_x0000_s1051" name="Photo Editor Photo" r:id="rId11" imgW="4944165" imgH="3742857" progId="MSPhotoEd.3">
                   <p:embed/>
                 </p:oleObj>
               </mc:Choice>
@@ -8017,8 +7936,8 @@
                     </p:blipFill>
                     <p:spPr bwMode="auto">
                       <a:xfrm>
-                        <a:off x="3509963" y="2095500"/>
-                        <a:ext cx="4943475" cy="3743325"/>
+                        <a:off x="9144000" y="1213231"/>
+                        <a:ext cx="2431656" cy="1841312"/>
                       </a:xfrm>
                       <a:prstGeom prst="rect">
                         <a:avLst/>
@@ -8028,34 +7947,6 @@
                         <a:noFill/>
                       </a:ln>
                       <a:effectLst/>
-                      <a:extLst>
-                        <a:ext uri="{909E8E84-426E-40DD-AFC4-6F175D3DCCD1}">
-                          <a14:hiddenFill xmlns:a14="http://schemas.microsoft.com/office/drawing/2010/main">
-                            <a:solidFill>
-                              <a:schemeClr val="accent1"/>
-                            </a:solidFill>
-                          </a14:hiddenFill>
-                        </a:ext>
-                        <a:ext uri="{91240B29-F687-4F45-9708-019B960494DF}">
-                          <a14:hiddenLine xmlns:a14="http://schemas.microsoft.com/office/drawing/2010/main" w="19050">
-                            <a:solidFill>
-                              <a:schemeClr val="tx1"/>
-                            </a:solidFill>
-                            <a:miter lim="800000"/>
-                            <a:headEnd/>
-                            <a:tailEnd/>
-                          </a14:hiddenLine>
-                        </a:ext>
-                        <a:ext uri="{AF507438-7753-43E0-B8FC-AC1667EBCBE1}">
-                          <a14:hiddenEffects xmlns:a14="http://schemas.microsoft.com/office/drawing/2010/main">
-                            <a:effectLst>
-                              <a:outerShdw dist="35921" dir="2700000" algn="ctr" rotWithShape="0">
-                                <a:schemeClr val="bg2"/>
-                              </a:outerShdw>
-                            </a:effectLst>
-                          </a14:hiddenEffects>
-                        </a:ext>
-                      </a:extLst>
                     </p:spPr>
                   </p:pic>
                 </p:oleObj>
@@ -8070,17 +7961,23 @@
           <p:cNvGraphicFramePr>
             <a:graphicFrameLocks noChangeAspect="1"/>
           </p:cNvGraphicFramePr>
-          <p:nvPr/>
+          <p:nvPr>
+            <p:extLst>
+              <p:ext uri="{D42A27DB-BD31-4B8C-83A1-F6EECF244321}">
+                <p14:modId xmlns:p14="http://schemas.microsoft.com/office/powerpoint/2010/main" val="1683491091"/>
+              </p:ext>
+            </p:extLst>
+          </p:nvPr>
         </p:nvGraphicFramePr>
         <p:xfrm>
-          <a:off x="3594100" y="2074863"/>
-          <a:ext cx="4848225" cy="3781425"/>
+          <a:off x="157662" y="4060844"/>
+          <a:ext cx="3479301" cy="2713718"/>
         </p:xfrm>
         <a:graphic>
           <a:graphicData uri="http://schemas.openxmlformats.org/presentationml/2006/ole">
             <mc:AlternateContent xmlns:mc="http://schemas.openxmlformats.org/markup-compatibility/2006">
               <mc:Choice xmlns:v="urn:schemas-microsoft-com:vml" Requires="v">
-                <p:oleObj spid="_x0000_s1030" name="Photo Editor Photo" r:id="rId13" imgW="4847619" imgH="3780952" progId="MSPhotoEd.3">
+                <p:oleObj spid="_x0000_s1052" name="Photo Editor Photo" r:id="rId13" imgW="4847619" imgH="3780952" progId="MSPhotoEd.3">
                   <p:embed/>
                 </p:oleObj>
               </mc:Choice>
@@ -8120,8 +8017,8 @@
                     </p:blipFill>
                     <p:spPr bwMode="auto">
                       <a:xfrm>
-                        <a:off x="3594100" y="2074863"/>
-                        <a:ext cx="4848225" cy="3781425"/>
+                        <a:off x="157662" y="4060844"/>
+                        <a:ext cx="3479301" cy="2713718"/>
                       </a:xfrm>
                       <a:prstGeom prst="rect">
                         <a:avLst/>
@@ -8131,34 +8028,6 @@
                         <a:noFill/>
                       </a:ln>
                       <a:effectLst/>
-                      <a:extLst>
-                        <a:ext uri="{909E8E84-426E-40DD-AFC4-6F175D3DCCD1}">
-                          <a14:hiddenFill xmlns:a14="http://schemas.microsoft.com/office/drawing/2010/main">
-                            <a:solidFill>
-                              <a:schemeClr val="accent1"/>
-                            </a:solidFill>
-                          </a14:hiddenFill>
-                        </a:ext>
-                        <a:ext uri="{91240B29-F687-4F45-9708-019B960494DF}">
-                          <a14:hiddenLine xmlns:a14="http://schemas.microsoft.com/office/drawing/2010/main" w="19050">
-                            <a:solidFill>
-                              <a:schemeClr val="tx1"/>
-                            </a:solidFill>
-                            <a:miter lim="800000"/>
-                            <a:headEnd/>
-                            <a:tailEnd/>
-                          </a14:hiddenLine>
-                        </a:ext>
-                        <a:ext uri="{AF507438-7753-43E0-B8FC-AC1667EBCBE1}">
-                          <a14:hiddenEffects xmlns:a14="http://schemas.microsoft.com/office/drawing/2010/main">
-                            <a:effectLst>
-                              <a:outerShdw dist="35921" dir="2700000" algn="ctr" rotWithShape="0">
-                                <a:schemeClr val="bg2"/>
-                              </a:outerShdw>
-                            </a:effectLst>
-                          </a14:hiddenEffects>
-                        </a:ext>
-                      </a:extLst>
                     </p:spPr>
                   </p:pic>
                 </p:oleObj>
@@ -8169,30 +8038,36 @@
       </p:graphicFrame>
       <p:graphicFrame>
         <p:nvGraphicFramePr>
-          <p:cNvPr id="1383434" name="Object 10"/>
+          <p:cNvPr id="1383435" name="Object 11"/>
           <p:cNvGraphicFramePr>
             <a:graphicFrameLocks noChangeAspect="1"/>
           </p:cNvGraphicFramePr>
-          <p:nvPr/>
+          <p:nvPr>
+            <p:extLst>
+              <p:ext uri="{D42A27DB-BD31-4B8C-83A1-F6EECF244321}">
+                <p14:modId xmlns:p14="http://schemas.microsoft.com/office/powerpoint/2010/main" val="2975962888"/>
+              </p:ext>
+            </p:extLst>
+          </p:nvPr>
         </p:nvGraphicFramePr>
         <p:xfrm>
-          <a:off x="3657600" y="2128838"/>
-          <a:ext cx="4714875" cy="3667125"/>
+          <a:off x="9220201" y="3333944"/>
+          <a:ext cx="2743200" cy="2204658"/>
         </p:xfrm>
         <a:graphic>
           <a:graphicData uri="http://schemas.openxmlformats.org/presentationml/2006/ole">
             <mc:AlternateContent xmlns:mc="http://schemas.openxmlformats.org/markup-compatibility/2006">
               <mc:Choice xmlns:v="urn:schemas-microsoft-com:vml" Requires="v">
-                <p:oleObj spid="_x0000_s1031" name="Photo Editor Photo" r:id="rId15" imgW="4715533" imgH="3666667" progId="MSPhotoEd.3">
+                <p:oleObj spid="_x0000_s1053" name="Photo Editor Photo" r:id="rId15" imgW="4657143" imgH="3742857" progId="MSPhotoEd.3">
                   <p:embed/>
                 </p:oleObj>
               </mc:Choice>
               <mc:Fallback>
-                <p:oleObj name="Photo Editor Photo" r:id="rId15" imgW="4715533" imgH="3666667" progId="MSPhotoEd.3">
+                <p:oleObj name="Photo Editor Photo" r:id="rId15" imgW="4657143" imgH="3742857" progId="MSPhotoEd.3">
                   <p:embed/>
                   <p:pic>
                     <p:nvPicPr>
-                      <p:cNvPr id="1383434" name="Object 10"/>
+                      <p:cNvPr id="1383435" name="Object 11"/>
                       <p:cNvPicPr>
                         <a:picLocks noChangeAspect="1" noChangeArrowheads="1"/>
                       </p:cNvPicPr>
@@ -8223,8 +8098,8 @@
                     </p:blipFill>
                     <p:spPr bwMode="auto">
                       <a:xfrm>
-                        <a:off x="3657600" y="2128838"/>
-                        <a:ext cx="4714875" cy="3667125"/>
+                        <a:off x="9220201" y="3333944"/>
+                        <a:ext cx="2743200" cy="2204658"/>
                       </a:xfrm>
                       <a:prstGeom prst="rect">
                         <a:avLst/>
@@ -8234,137 +8109,6 @@
                         <a:noFill/>
                       </a:ln>
                       <a:effectLst/>
-                      <a:extLst>
-                        <a:ext uri="{909E8E84-426E-40DD-AFC4-6F175D3DCCD1}">
-                          <a14:hiddenFill xmlns:a14="http://schemas.microsoft.com/office/drawing/2010/main">
-                            <a:solidFill>
-                              <a:schemeClr val="accent1"/>
-                            </a:solidFill>
-                          </a14:hiddenFill>
-                        </a:ext>
-                        <a:ext uri="{91240B29-F687-4F45-9708-019B960494DF}">
-                          <a14:hiddenLine xmlns:a14="http://schemas.microsoft.com/office/drawing/2010/main" w="19050">
-                            <a:solidFill>
-                              <a:schemeClr val="tx1"/>
-                            </a:solidFill>
-                            <a:miter lim="800000"/>
-                            <a:headEnd/>
-                            <a:tailEnd/>
-                          </a14:hiddenLine>
-                        </a:ext>
-                        <a:ext uri="{AF507438-7753-43E0-B8FC-AC1667EBCBE1}">
-                          <a14:hiddenEffects xmlns:a14="http://schemas.microsoft.com/office/drawing/2010/main">
-                            <a:effectLst>
-                              <a:outerShdw dist="35921" dir="2700000" algn="ctr" rotWithShape="0">
-                                <a:schemeClr val="bg2"/>
-                              </a:outerShdw>
-                            </a:effectLst>
-                          </a14:hiddenEffects>
-                        </a:ext>
-                      </a:extLst>
-                    </p:spPr>
-                  </p:pic>
-                </p:oleObj>
-              </mc:Fallback>
-            </mc:AlternateContent>
-          </a:graphicData>
-        </a:graphic>
-      </p:graphicFrame>
-      <p:graphicFrame>
-        <p:nvGraphicFramePr>
-          <p:cNvPr id="1383435" name="Object 11"/>
-          <p:cNvGraphicFramePr>
-            <a:graphicFrameLocks noChangeAspect="1"/>
-          </p:cNvGraphicFramePr>
-          <p:nvPr/>
-        </p:nvGraphicFramePr>
-        <p:xfrm>
-          <a:off x="3640138" y="2073275"/>
-          <a:ext cx="4657725" cy="3743325"/>
-        </p:xfrm>
-        <a:graphic>
-          <a:graphicData uri="http://schemas.openxmlformats.org/presentationml/2006/ole">
-            <mc:AlternateContent xmlns:mc="http://schemas.openxmlformats.org/markup-compatibility/2006">
-              <mc:Choice xmlns:v="urn:schemas-microsoft-com:vml" Requires="v">
-                <p:oleObj spid="_x0000_s1032" name="Photo Editor Photo" r:id="rId17" imgW="4657143" imgH="3742857" progId="MSPhotoEd.3">
-                  <p:embed/>
-                </p:oleObj>
-              </mc:Choice>
-              <mc:Fallback>
-                <p:oleObj name="Photo Editor Photo" r:id="rId17" imgW="4657143" imgH="3742857" progId="MSPhotoEd.3">
-                  <p:embed/>
-                  <p:pic>
-                    <p:nvPicPr>
-                      <p:cNvPr id="1383435" name="Object 11"/>
-                      <p:cNvPicPr>
-                        <a:picLocks noChangeAspect="1" noChangeArrowheads="1"/>
-                      </p:cNvPicPr>
-                      <p:nvPr/>
-                    </p:nvPicPr>
-                    <p:blipFill>
-                      <a:blip r:embed="rId18">
-                        <a:clrChange>
-                          <a:clrFrom>
-                            <a:srgbClr val="CCCCCC"/>
-                          </a:clrFrom>
-                          <a:clrTo>
-                            <a:srgbClr val="CCCCCC">
-                              <a:alpha val="0"/>
-                            </a:srgbClr>
-                          </a:clrTo>
-                        </a:clrChange>
-                        <a:extLst>
-                          <a:ext uri="{28A0092B-C50C-407E-A947-70E740481C1C}">
-                            <a14:useLocalDpi xmlns:a14="http://schemas.microsoft.com/office/drawing/2010/main" val="0"/>
-                          </a:ext>
-                        </a:extLst>
-                      </a:blip>
-                      <a:srcRect/>
-                      <a:stretch>
-                        <a:fillRect/>
-                      </a:stretch>
-                    </p:blipFill>
-                    <p:spPr bwMode="auto">
-                      <a:xfrm>
-                        <a:off x="3640138" y="2073275"/>
-                        <a:ext cx="4657725" cy="3743325"/>
-                      </a:xfrm>
-                      <a:prstGeom prst="rect">
-                        <a:avLst/>
-                      </a:prstGeom>
-                      <a:noFill/>
-                      <a:ln>
-                        <a:noFill/>
-                      </a:ln>
-                      <a:effectLst/>
-                      <a:extLst>
-                        <a:ext uri="{909E8E84-426E-40DD-AFC4-6F175D3DCCD1}">
-                          <a14:hiddenFill xmlns:a14="http://schemas.microsoft.com/office/drawing/2010/main">
-                            <a:solidFill>
-                              <a:schemeClr val="accent1"/>
-                            </a:solidFill>
-                          </a14:hiddenFill>
-                        </a:ext>
-                        <a:ext uri="{91240B29-F687-4F45-9708-019B960494DF}">
-                          <a14:hiddenLine xmlns:a14="http://schemas.microsoft.com/office/drawing/2010/main" w="19050">
-                            <a:solidFill>
-                              <a:schemeClr val="tx1"/>
-                            </a:solidFill>
-                            <a:miter lim="800000"/>
-                            <a:headEnd/>
-                            <a:tailEnd/>
-                          </a14:hiddenLine>
-                        </a:ext>
-                        <a:ext uri="{AF507438-7753-43E0-B8FC-AC1667EBCBE1}">
-                          <a14:hiddenEffects xmlns:a14="http://schemas.microsoft.com/office/drawing/2010/main">
-                            <a:effectLst>
-                              <a:outerShdw dist="35921" dir="2700000" algn="ctr" rotWithShape="0">
-                                <a:schemeClr val="bg2"/>
-                              </a:outerShdw>
-                            </a:effectLst>
-                          </a14:hiddenEffects>
-                        </a:ext>
-                      </a:extLst>
                     </p:spPr>
                   </p:pic>
                 </p:oleObj>
@@ -8768,60 +8512,15 @@
                                   </p:childTnLst>
                                 </p:cTn>
                               </p:par>
-                            </p:childTnLst>
-                          </p:cTn>
-                        </p:par>
-                      </p:childTnLst>
-                    </p:cTn>
-                  </p:par>
-                  <p:par>
-                    <p:cTn id="35" fill="hold">
-                      <p:stCondLst>
-                        <p:cond delay="indefinite"/>
-                      </p:stCondLst>
-                      <p:childTnLst>
-                        <p:par>
-                          <p:cTn id="36" fill="hold">
-                            <p:stCondLst>
-                              <p:cond delay="0"/>
-                            </p:stCondLst>
-                            <p:childTnLst>
                               <p:par>
-                                <p:cTn id="37" presetID="1" presetClass="entr" presetSubtype="0" fill="hold" nodeType="clickEffect">
+                                <p:cTn id="35" presetID="1" presetClass="exit" presetSubtype="0" fill="hold" nodeType="withEffect">
                                   <p:stCondLst>
                                     <p:cond delay="0"/>
                                   </p:stCondLst>
                                   <p:childTnLst>
                                     <p:set>
                                       <p:cBhvr>
-                                        <p:cTn id="38" dur="1" fill="hold">
-                                          <p:stCondLst>
-                                            <p:cond delay="0"/>
-                                          </p:stCondLst>
-                                        </p:cTn>
-                                        <p:tgtEl>
-                                          <p:spTgt spid="1383434"/>
-                                        </p:tgtEl>
-                                        <p:attrNameLst>
-                                          <p:attrName>style.visibility</p:attrName>
-                                        </p:attrNameLst>
-                                      </p:cBhvr>
-                                      <p:to>
-                                        <p:strVal val="visible"/>
-                                      </p:to>
-                                    </p:set>
-                                  </p:childTnLst>
-                                </p:cTn>
-                              </p:par>
-                              <p:par>
-                                <p:cTn id="39" presetID="1" presetClass="exit" presetSubtype="0" fill="hold" nodeType="withEffect">
-                                  <p:stCondLst>
-                                    <p:cond delay="0"/>
-                                  </p:stCondLst>
-                                  <p:childTnLst>
-                                    <p:set>
-                                      <p:cBhvr>
-                                        <p:cTn id="40" dur="1" fill="hold">
+                                        <p:cTn id="36" dur="1" fill="hold">
                                           <p:stCondLst>
                                             <p:cond delay="0"/>
                                           </p:stCondLst>
@@ -8847,26 +8546,26 @@
                     </p:cTn>
                   </p:par>
                   <p:par>
-                    <p:cTn id="41" fill="hold">
+                    <p:cTn id="37" fill="hold">
                       <p:stCondLst>
                         <p:cond delay="indefinite"/>
                       </p:stCondLst>
                       <p:childTnLst>
                         <p:par>
-                          <p:cTn id="42" fill="hold">
+                          <p:cTn id="38" fill="hold">
                             <p:stCondLst>
                               <p:cond delay="0"/>
                             </p:stCondLst>
                             <p:childTnLst>
                               <p:par>
-                                <p:cTn id="43" presetID="1" presetClass="entr" presetSubtype="0" fill="hold" nodeType="clickEffect">
+                                <p:cTn id="39" presetID="1" presetClass="entr" presetSubtype="0" fill="hold" nodeType="clickEffect">
                                   <p:stCondLst>
                                     <p:cond delay="0"/>
                                   </p:stCondLst>
                                   <p:childTnLst>
                                     <p:set>
                                       <p:cBhvr>
-                                        <p:cTn id="44" dur="1" fill="hold">
+                                        <p:cTn id="40" dur="1" fill="hold">
                                           <p:stCondLst>
                                             <p:cond delay="0"/>
                                           </p:stCondLst>
@@ -8885,21 +8584,277 @@
                                   </p:childTnLst>
                                 </p:cTn>
                               </p:par>
+                            </p:childTnLst>
+                          </p:cTn>
+                        </p:par>
+                      </p:childTnLst>
+                    </p:cTn>
+                  </p:par>
+                </p:childTnLst>
+              </p:cTn>
+              <p:prevCondLst>
+                <p:cond evt="onPrev" delay="0">
+                  <p:tgtEl>
+                    <p:sldTgt/>
+                  </p:tgtEl>
+                </p:cond>
+              </p:prevCondLst>
+              <p:nextCondLst>
+                <p:cond evt="onNext" delay="0">
+                  <p:tgtEl>
+                    <p:sldTgt/>
+                  </p:tgtEl>
+                </p:cond>
+              </p:nextCondLst>
+            </p:seq>
+          </p:childTnLst>
+        </p:cTn>
+      </p:par>
+    </p:tnLst>
+  </p:timing>
+</p:sld>
+</file>
+
+<file path=ppt/slides/slide16.xml><?xml version="1.0" encoding="utf-8"?>
+<p:sld xmlns:a="http://schemas.openxmlformats.org/drawingml/2006/main" xmlns:r="http://schemas.openxmlformats.org/officeDocument/2006/relationships" xmlns:p="http://schemas.openxmlformats.org/presentationml/2006/main">
+  <p:cSld>
+    <p:spTree>
+      <p:nvGrpSpPr>
+        <p:cNvPr id="1" name=""/>
+        <p:cNvGrpSpPr/>
+        <p:nvPr/>
+      </p:nvGrpSpPr>
+      <p:grpSpPr>
+        <a:xfrm>
+          <a:off x="0" y="0"/>
+          <a:ext cx="0" cy="0"/>
+          <a:chOff x="0" y="0"/>
+          <a:chExt cx="0" cy="0"/>
+        </a:xfrm>
+      </p:grpSpPr>
+      <p:sp>
+        <p:nvSpPr>
+          <p:cNvPr id="2" name="Title 1">
+            <a:extLst>
+              <a:ext uri="{FF2B5EF4-FFF2-40B4-BE49-F238E27FC236}">
+                <a16:creationId xmlns:a16="http://schemas.microsoft.com/office/drawing/2014/main" id="{91496A31-DBB3-3343-B883-2A822530D974}"/>
+              </a:ext>
+            </a:extLst>
+          </p:cNvPr>
+          <p:cNvSpPr>
+            <a:spLocks noGrp="1"/>
+          </p:cNvSpPr>
+          <p:nvPr>
+            <p:ph type="title"/>
+          </p:nvPr>
+        </p:nvSpPr>
+        <p:spPr/>
+        <p:txBody>
+          <a:bodyPr/>
+          <a:lstStyle/>
+          <a:p>
+            <a:pPr algn="ctr" rtl="1" eaLnBrk="1" fontAlgn="base" hangingPunct="1">
+              <a:spcBef>
+                <a:spcPct val="0"/>
+              </a:spcBef>
+              <a:spcAft>
+                <a:spcPct val="0"/>
+              </a:spcAft>
+            </a:pPr>
+            <a:r>
+              <a:rPr lang="en-US" dirty="0"/>
+              <a:t>Separable cont.</a:t>
+            </a:r>
+          </a:p>
+        </p:txBody>
+      </p:sp>
+      <p:graphicFrame>
+        <p:nvGraphicFramePr>
+          <p:cNvPr id="4" name="Object 10">
+            <a:extLst>
+              <a:ext uri="{FF2B5EF4-FFF2-40B4-BE49-F238E27FC236}">
+                <a16:creationId xmlns:a16="http://schemas.microsoft.com/office/drawing/2014/main" id="{8833DCD0-5365-6D46-AAB1-685539037C9F}"/>
+              </a:ext>
+            </a:extLst>
+          </p:cNvPr>
+          <p:cNvGraphicFramePr>
+            <a:graphicFrameLocks noChangeAspect="1"/>
+          </p:cNvGraphicFramePr>
+          <p:nvPr>
+            <p:extLst>
+              <p:ext uri="{D42A27DB-BD31-4B8C-83A1-F6EECF244321}">
+                <p14:modId xmlns:p14="http://schemas.microsoft.com/office/powerpoint/2010/main" val="1653643096"/>
+              </p:ext>
+            </p:extLst>
+          </p:nvPr>
+        </p:nvGraphicFramePr>
+        <p:xfrm>
+          <a:off x="152400" y="1595437"/>
+          <a:ext cx="4714875" cy="3667125"/>
+        </p:xfrm>
+        <a:graphic>
+          <a:graphicData uri="http://schemas.openxmlformats.org/presentationml/2006/ole">
+            <mc:AlternateContent xmlns:mc="http://schemas.openxmlformats.org/markup-compatibility/2006">
+              <mc:Choice xmlns:v="urn:schemas-microsoft-com:vml" Requires="v">
+                <p:oleObj spid="_x0000_s3075" name="Photo Editor Photo" r:id="rId3" imgW="4715533" imgH="3666667" progId="MSPhotoEd.3">
+                  <p:embed/>
+                </p:oleObj>
+              </mc:Choice>
+              <mc:Fallback>
+                <p:oleObj name="Photo Editor Photo" r:id="rId3" imgW="4715533" imgH="3666667" progId="MSPhotoEd.3">
+                  <p:embed/>
+                  <p:pic>
+                    <p:nvPicPr>
+                      <p:cNvPr id="1383434" name="Object 10"/>
+                      <p:cNvPicPr>
+                        <a:picLocks noChangeAspect="1" noChangeArrowheads="1"/>
+                      </p:cNvPicPr>
+                      <p:nvPr/>
+                    </p:nvPicPr>
+                    <p:blipFill>
+                      <a:blip r:embed="rId4">
+                        <a:clrChange>
+                          <a:clrFrom>
+                            <a:srgbClr val="CCCCCC"/>
+                          </a:clrFrom>
+                          <a:clrTo>
+                            <a:srgbClr val="CCCCCC">
+                              <a:alpha val="0"/>
+                            </a:srgbClr>
+                          </a:clrTo>
+                        </a:clrChange>
+                        <a:extLst>
+                          <a:ext uri="{28A0092B-C50C-407E-A947-70E740481C1C}">
+                            <a14:useLocalDpi xmlns:a14="http://schemas.microsoft.com/office/drawing/2010/main" val="0"/>
+                          </a:ext>
+                        </a:extLst>
+                      </a:blip>
+                      <a:srcRect/>
+                      <a:stretch>
+                        <a:fillRect/>
+                      </a:stretch>
+                    </p:blipFill>
+                    <p:spPr bwMode="auto">
+                      <a:xfrm>
+                        <a:off x="152400" y="1595437"/>
+                        <a:ext cx="4714875" cy="3667125"/>
+                      </a:xfrm>
+                      <a:prstGeom prst="rect">
+                        <a:avLst/>
+                      </a:prstGeom>
+                      <a:noFill/>
+                      <a:ln>
+                        <a:noFill/>
+                      </a:ln>
+                      <a:effectLst/>
+                      <a:extLst>
+                        <a:ext uri="{909E8E84-426E-40DD-AFC4-6F175D3DCCD1}">
+                          <a14:hiddenFill xmlns:a14="http://schemas.microsoft.com/office/drawing/2010/main">
+                            <a:solidFill>
+                              <a:schemeClr val="accent1"/>
+                            </a:solidFill>
+                          </a14:hiddenFill>
+                        </a:ext>
+                        <a:ext uri="{91240B29-F687-4F45-9708-019B960494DF}">
+                          <a14:hiddenLine xmlns:a14="http://schemas.microsoft.com/office/drawing/2010/main" w="19050">
+                            <a:solidFill>
+                              <a:schemeClr val="tx1"/>
+                            </a:solidFill>
+                            <a:miter lim="800000"/>
+                            <a:headEnd/>
+                            <a:tailEnd/>
+                          </a14:hiddenLine>
+                        </a:ext>
+                        <a:ext uri="{AF507438-7753-43E0-B8FC-AC1667EBCBE1}">
+                          <a14:hiddenEffects xmlns:a14="http://schemas.microsoft.com/office/drawing/2010/main">
+                            <a:effectLst>
+                              <a:outerShdw dist="35921" dir="2700000" algn="ctr" rotWithShape="0">
+                                <a:schemeClr val="bg2"/>
+                              </a:outerShdw>
+                            </a:effectLst>
+                          </a14:hiddenEffects>
+                        </a:ext>
+                      </a:extLst>
+                    </p:spPr>
+                  </p:pic>
+                </p:oleObj>
+              </mc:Fallback>
+            </mc:AlternateContent>
+          </a:graphicData>
+        </a:graphic>
+      </p:graphicFrame>
+    </p:spTree>
+    <p:extLst>
+      <p:ext uri="{BB962C8B-B14F-4D97-AF65-F5344CB8AC3E}">
+        <p14:creationId xmlns:p14="http://schemas.microsoft.com/office/powerpoint/2010/main" val="2590341666"/>
+      </p:ext>
+    </p:extLst>
+  </p:cSld>
+  <p:clrMapOvr>
+    <a:masterClrMapping/>
+  </p:clrMapOvr>
+  <p:timing>
+    <p:tnLst>
+      <p:par>
+        <p:cTn id="1" dur="indefinite" restart="never" nodeType="tmRoot">
+          <p:childTnLst>
+            <p:seq concurrent="1" nextAc="seek">
+              <p:cTn id="2" dur="indefinite" nodeType="mainSeq">
+                <p:childTnLst>
+                  <p:par>
+                    <p:cTn id="3" fill="hold">
+                      <p:stCondLst>
+                        <p:cond delay="indefinite"/>
+                      </p:stCondLst>
+                      <p:childTnLst>
+                        <p:par>
+                          <p:cTn id="4" fill="hold">
+                            <p:stCondLst>
+                              <p:cond delay="0"/>
+                            </p:stCondLst>
+                            <p:childTnLst>
                               <p:par>
-                                <p:cTn id="45" presetID="1" presetClass="exit" presetSubtype="0" fill="hold" nodeType="withEffect">
+                                <p:cTn id="5" presetID="1" presetClass="entr" presetSubtype="0" fill="hold" nodeType="clickEffect">
                                   <p:stCondLst>
                                     <p:cond delay="0"/>
                                   </p:stCondLst>
                                   <p:childTnLst>
                                     <p:set>
                                       <p:cBhvr>
-                                        <p:cTn id="46" dur="1" fill="hold">
+                                        <p:cTn id="6" dur="1" fill="hold">
                                           <p:stCondLst>
                                             <p:cond delay="0"/>
                                           </p:stCondLst>
                                         </p:cTn>
                                         <p:tgtEl>
-                                          <p:spTgt spid="1383434"/>
+                                          <p:spTgt spid="4"/>
+                                        </p:tgtEl>
+                                        <p:attrNameLst>
+                                          <p:attrName>style.visibility</p:attrName>
+                                        </p:attrNameLst>
+                                      </p:cBhvr>
+                                      <p:to>
+                                        <p:strVal val="visible"/>
+                                      </p:to>
+                                    </p:set>
+                                  </p:childTnLst>
+                                </p:cTn>
+                              </p:par>
+                              <p:par>
+                                <p:cTn id="7" presetID="1" presetClass="exit" presetSubtype="0" fill="hold" nodeType="withEffect">
+                                  <p:stCondLst>
+                                    <p:cond delay="0"/>
+                                  </p:stCondLst>
+                                  <p:childTnLst>
+                                    <p:set>
+                                      <p:cBhvr>
+                                        <p:cTn id="8" dur="1" fill="hold">
+                                          <p:stCondLst>
+                                            <p:cond delay="0"/>
+                                          </p:stCondLst>
+                                        </p:cTn>
+                                        <p:tgtEl>
+                                          <p:spTgt spid="4"/>
                                         </p:tgtEl>
                                         <p:attrNameLst>
                                           <p:attrName>style.visibility</p:attrName>
@@ -8943,7 +8898,7 @@
 </p:sld>
 </file>
 
-<file path=ppt/slides/slide16.xml><?xml version="1.0" encoding="utf-8"?>
+<file path=ppt/slides/slide17.xml><?xml version="1.0" encoding="utf-8"?>
 <p:sld xmlns:a="http://schemas.openxmlformats.org/drawingml/2006/main" xmlns:r="http://schemas.openxmlformats.org/officeDocument/2006/relationships" xmlns:p="http://schemas.openxmlformats.org/presentationml/2006/main">
   <p:cSld>
     <p:spTree>
@@ -10472,7 +10427,7 @@
 </p:sld>
 </file>
 
-<file path=ppt/slides/slide17.xml><?xml version="1.0" encoding="utf-8"?>
+<file path=ppt/slides/slide18.xml><?xml version="1.0" encoding="utf-8"?>
 <p:sld xmlns:a="http://schemas.openxmlformats.org/drawingml/2006/main" xmlns:r="http://schemas.openxmlformats.org/officeDocument/2006/relationships" xmlns:p="http://schemas.openxmlformats.org/presentationml/2006/main">
   <p:cSld>
     <p:spTree>
@@ -11714,7 +11669,7 @@
 </p:sld>
 </file>
 
-<file path=ppt/slides/slide18.xml><?xml version="1.0" encoding="utf-8"?>
+<file path=ppt/slides/slide19.xml><?xml version="1.0" encoding="utf-8"?>
 <p:sld xmlns:a="http://schemas.openxmlformats.org/drawingml/2006/main" xmlns:r="http://schemas.openxmlformats.org/officeDocument/2006/relationships" xmlns:p="http://schemas.openxmlformats.org/presentationml/2006/main">
   <p:cSld>
     <p:spTree>
@@ -12249,7 +12204,85 @@
 </p:sld>
 </file>
 
-<file path=ppt/slides/slide19.xml><?xml version="1.0" encoding="utf-8"?>
+<file path=ppt/slides/slide2.xml><?xml version="1.0" encoding="utf-8"?>
+<p:sld xmlns:a="http://schemas.openxmlformats.org/drawingml/2006/main" xmlns:r="http://schemas.openxmlformats.org/officeDocument/2006/relationships" xmlns:p="http://schemas.openxmlformats.org/presentationml/2006/main">
+  <p:cSld>
+    <p:spTree>
+      <p:nvGrpSpPr>
+        <p:cNvPr id="1" name=""/>
+        <p:cNvGrpSpPr/>
+        <p:nvPr/>
+      </p:nvGrpSpPr>
+      <p:grpSpPr>
+        <a:xfrm>
+          <a:off x="0" y="0"/>
+          <a:ext cx="0" cy="0"/>
+          <a:chOff x="0" y="0"/>
+          <a:chExt cx="0" cy="0"/>
+        </a:xfrm>
+      </p:grpSpPr>
+      <p:sp>
+        <p:nvSpPr>
+          <p:cNvPr id="2" name="Title 1"/>
+          <p:cNvSpPr>
+            <a:spLocks noGrp="1"/>
+          </p:cNvSpPr>
+          <p:nvPr>
+            <p:ph type="title"/>
+          </p:nvPr>
+        </p:nvSpPr>
+        <p:spPr/>
+        <p:txBody>
+          <a:bodyPr/>
+          <a:lstStyle/>
+          <a:p>
+            <a:r>
+              <a:rPr lang="en-US" dirty="0"/>
+              <a:t>Error-Driven Classification</a:t>
+            </a:r>
+          </a:p>
+        </p:txBody>
+      </p:sp>
+      <p:pic>
+        <p:nvPicPr>
+          <p:cNvPr id="90114" name="Picture 2"/>
+          <p:cNvPicPr>
+            <a:picLocks noChangeAspect="1" noChangeArrowheads="1"/>
+          </p:cNvPicPr>
+          <p:nvPr/>
+        </p:nvPicPr>
+        <p:blipFill>
+          <a:blip r:embed="rId2">
+            <a:extLst>
+              <a:ext uri="{28A0092B-C50C-407E-A947-70E740481C1C}">
+                <a14:useLocalDpi xmlns:a14="http://schemas.microsoft.com/office/drawing/2010/main" val="0"/>
+              </a:ext>
+            </a:extLst>
+          </a:blip>
+          <a:stretch>
+            <a:fillRect/>
+          </a:stretch>
+        </p:blipFill>
+        <p:spPr bwMode="auto">
+          <a:xfrm>
+            <a:off x="1205413" y="1676756"/>
+            <a:ext cx="9767387" cy="3885488"/>
+          </a:xfrm>
+          <a:prstGeom prst="rect">
+            <a:avLst/>
+          </a:prstGeom>
+          <a:noFill/>
+        </p:spPr>
+      </p:pic>
+    </p:spTree>
+  </p:cSld>
+  <p:clrMapOvr>
+    <a:masterClrMapping/>
+  </p:clrMapOvr>
+</p:sld>
+</file>
+
+<file path=ppt/slides/slide20.xml><?xml version="1.0" encoding="utf-8"?>
 <p:sld xmlns:a="http://schemas.openxmlformats.org/drawingml/2006/main" xmlns:r="http://schemas.openxmlformats.org/officeDocument/2006/relationships" xmlns:p="http://schemas.openxmlformats.org/presentationml/2006/main">
   <p:cSld>
     <p:spTree>
@@ -14048,85 +14081,7 @@
 </p:sld>
 </file>
 
-<file path=ppt/slides/slide2.xml><?xml version="1.0" encoding="utf-8"?>
-<p:sld xmlns:a="http://schemas.openxmlformats.org/drawingml/2006/main" xmlns:r="http://schemas.openxmlformats.org/officeDocument/2006/relationships" xmlns:p="http://schemas.openxmlformats.org/presentationml/2006/main">
-  <p:cSld>
-    <p:spTree>
-      <p:nvGrpSpPr>
-        <p:cNvPr id="1" name=""/>
-        <p:cNvGrpSpPr/>
-        <p:nvPr/>
-      </p:nvGrpSpPr>
-      <p:grpSpPr>
-        <a:xfrm>
-          <a:off x="0" y="0"/>
-          <a:ext cx="0" cy="0"/>
-          <a:chOff x="0" y="0"/>
-          <a:chExt cx="0" cy="0"/>
-        </a:xfrm>
-      </p:grpSpPr>
-      <p:sp>
-        <p:nvSpPr>
-          <p:cNvPr id="2" name="Title 1"/>
-          <p:cNvSpPr>
-            <a:spLocks noGrp="1"/>
-          </p:cNvSpPr>
-          <p:nvPr>
-            <p:ph type="title"/>
-          </p:nvPr>
-        </p:nvSpPr>
-        <p:spPr/>
-        <p:txBody>
-          <a:bodyPr/>
-          <a:lstStyle/>
-          <a:p>
-            <a:r>
-              <a:rPr lang="en-US" dirty="0"/>
-              <a:t>Error-Driven Classification</a:t>
-            </a:r>
-          </a:p>
-        </p:txBody>
-      </p:sp>
-      <p:pic>
-        <p:nvPicPr>
-          <p:cNvPr id="90114" name="Picture 2"/>
-          <p:cNvPicPr>
-            <a:picLocks noChangeAspect="1" noChangeArrowheads="1"/>
-          </p:cNvPicPr>
-          <p:nvPr/>
-        </p:nvPicPr>
-        <p:blipFill>
-          <a:blip r:embed="rId2">
-            <a:extLst>
-              <a:ext uri="{28A0092B-C50C-407E-A947-70E740481C1C}">
-                <a14:useLocalDpi xmlns:a14="http://schemas.microsoft.com/office/drawing/2010/main" val="0"/>
-              </a:ext>
-            </a:extLst>
-          </a:blip>
-          <a:stretch>
-            <a:fillRect/>
-          </a:stretch>
-        </p:blipFill>
-        <p:spPr bwMode="auto">
-          <a:xfrm>
-            <a:off x="1205413" y="1676756"/>
-            <a:ext cx="9767387" cy="3885488"/>
-          </a:xfrm>
-          <a:prstGeom prst="rect">
-            <a:avLst/>
-          </a:prstGeom>
-          <a:noFill/>
-        </p:spPr>
-      </p:pic>
-    </p:spTree>
-  </p:cSld>
-  <p:clrMapOvr>
-    <a:masterClrMapping/>
-  </p:clrMapOvr>
-</p:sld>
-</file>
-
-<file path=ppt/slides/slide20.xml><?xml version="1.0" encoding="utf-8"?>
+<file path=ppt/slides/slide21.xml><?xml version="1.0" encoding="utf-8"?>
 <p:sld xmlns:a="http://schemas.openxmlformats.org/drawingml/2006/main" xmlns:r="http://schemas.openxmlformats.org/officeDocument/2006/relationships" xmlns:p="http://schemas.openxmlformats.org/presentationml/2006/main">
   <p:cSld>
     <p:spTree>
@@ -14210,7 +14165,7 @@
           <a:graphicData uri="http://schemas.openxmlformats.org/presentationml/2006/ole">
             <mc:AlternateContent xmlns:mc="http://schemas.openxmlformats.org/markup-compatibility/2006">
               <mc:Choice xmlns:v="urn:schemas-microsoft-com:vml" Requires="v">
-                <p:oleObj spid="_x0000_s2049" name="Photo Editor Photo" r:id="rId3" imgW="4753639" imgH="3704762" progId="MSPhotoEd.3">
+                <p:oleObj spid="_x0000_s2058" name="Photo Editor Photo" r:id="rId3" imgW="4753639" imgH="3704762" progId="MSPhotoEd.3">
                   <p:embed/>
                 </p:oleObj>
               </mc:Choice>
@@ -14303,17 +14258,23 @@
           <p:cNvGraphicFramePr>
             <a:graphicFrameLocks noChangeAspect="1"/>
           </p:cNvGraphicFramePr>
-          <p:nvPr/>
+          <p:nvPr>
+            <p:extLst>
+              <p:ext uri="{D42A27DB-BD31-4B8C-83A1-F6EECF244321}">
+                <p14:modId xmlns:p14="http://schemas.microsoft.com/office/powerpoint/2010/main" val="1174735917"/>
+              </p:ext>
+            </p:extLst>
+          </p:nvPr>
         </p:nvGraphicFramePr>
         <p:xfrm>
-          <a:off x="3540125" y="2268538"/>
-          <a:ext cx="4829175" cy="3724275"/>
+          <a:off x="152400" y="2819400"/>
+          <a:ext cx="3154645" cy="2432872"/>
         </p:xfrm>
         <a:graphic>
           <a:graphicData uri="http://schemas.openxmlformats.org/presentationml/2006/ole">
             <mc:AlternateContent xmlns:mc="http://schemas.openxmlformats.org/markup-compatibility/2006">
               <mc:Choice xmlns:v="urn:schemas-microsoft-com:vml" Requires="v">
-                <p:oleObj spid="_x0000_s2050" name="Photo Editor Photo" r:id="rId5" imgW="4828571" imgH="3723810" progId="MSPhotoEd.3">
+                <p:oleObj spid="_x0000_s2059" name="Photo Editor Photo" r:id="rId5" imgW="4828571" imgH="3723810" progId="MSPhotoEd.3">
                   <p:embed/>
                 </p:oleObj>
               </mc:Choice>
@@ -14353,8 +14314,8 @@
                     </p:blipFill>
                     <p:spPr bwMode="auto">
                       <a:xfrm>
-                        <a:off x="3540125" y="2268538"/>
-                        <a:ext cx="4829175" cy="3724275"/>
+                        <a:off x="152400" y="2819400"/>
+                        <a:ext cx="3154645" cy="2432872"/>
                       </a:xfrm>
                       <a:prstGeom prst="rect">
                         <a:avLst/>
@@ -14364,34 +14325,6 @@
                         <a:noFill/>
                       </a:ln>
                       <a:effectLst/>
-                      <a:extLst>
-                        <a:ext uri="{909E8E84-426E-40DD-AFC4-6F175D3DCCD1}">
-                          <a14:hiddenFill xmlns:a14="http://schemas.microsoft.com/office/drawing/2010/main">
-                            <a:solidFill>
-                              <a:schemeClr val="accent1"/>
-                            </a:solidFill>
-                          </a14:hiddenFill>
-                        </a:ext>
-                        <a:ext uri="{91240B29-F687-4F45-9708-019B960494DF}">
-                          <a14:hiddenLine xmlns:a14="http://schemas.microsoft.com/office/drawing/2010/main" w="19050">
-                            <a:solidFill>
-                              <a:schemeClr val="tx1"/>
-                            </a:solidFill>
-                            <a:miter lim="800000"/>
-                            <a:headEnd/>
-                            <a:tailEnd/>
-                          </a14:hiddenLine>
-                        </a:ext>
-                        <a:ext uri="{AF507438-7753-43E0-B8FC-AC1667EBCBE1}">
-                          <a14:hiddenEffects xmlns:a14="http://schemas.microsoft.com/office/drawing/2010/main">
-                            <a:effectLst>
-                              <a:outerShdw dist="35921" dir="2700000" algn="ctr" rotWithShape="0">
-                                <a:schemeClr val="bg2"/>
-                              </a:outerShdw>
-                            </a:effectLst>
-                          </a14:hiddenEffects>
-                        </a:ext>
-                      </a:extLst>
                     </p:spPr>
                   </p:pic>
                 </p:oleObj>
@@ -14406,17 +14339,23 @@
           <p:cNvGraphicFramePr>
             <a:graphicFrameLocks noChangeAspect="1"/>
           </p:cNvGraphicFramePr>
-          <p:nvPr/>
+          <p:nvPr>
+            <p:extLst>
+              <p:ext uri="{D42A27DB-BD31-4B8C-83A1-F6EECF244321}">
+                <p14:modId xmlns:p14="http://schemas.microsoft.com/office/powerpoint/2010/main" val="3701328156"/>
+              </p:ext>
+            </p:extLst>
+          </p:nvPr>
         </p:nvGraphicFramePr>
         <p:xfrm>
-          <a:off x="3667125" y="2281238"/>
-          <a:ext cx="4714875" cy="3724275"/>
+          <a:off x="8620125" y="2619031"/>
+          <a:ext cx="3571875" cy="2821420"/>
         </p:xfrm>
         <a:graphic>
           <a:graphicData uri="http://schemas.openxmlformats.org/presentationml/2006/ole">
             <mc:AlternateContent xmlns:mc="http://schemas.openxmlformats.org/markup-compatibility/2006">
               <mc:Choice xmlns:v="urn:schemas-microsoft-com:vml" Requires="v">
-                <p:oleObj spid="_x0000_s2051" name="Photo Editor Photo" r:id="rId7" imgW="4715533" imgH="3723810" progId="MSPhotoEd.3">
+                <p:oleObj spid="_x0000_s2060" name="Photo Editor Photo" r:id="rId7" imgW="4715533" imgH="3723810" progId="MSPhotoEd.3">
                   <p:embed/>
                 </p:oleObj>
               </mc:Choice>
@@ -14456,8 +14395,8 @@
                     </p:blipFill>
                     <p:spPr bwMode="auto">
                       <a:xfrm>
-                        <a:off x="3667125" y="2281238"/>
-                        <a:ext cx="4714875" cy="3724275"/>
+                        <a:off x="8620125" y="2619031"/>
+                        <a:ext cx="3571875" cy="2821420"/>
                       </a:xfrm>
                       <a:prstGeom prst="rect">
                         <a:avLst/>
@@ -14467,34 +14406,6 @@
                         <a:noFill/>
                       </a:ln>
                       <a:effectLst/>
-                      <a:extLst>
-                        <a:ext uri="{909E8E84-426E-40DD-AFC4-6F175D3DCCD1}">
-                          <a14:hiddenFill xmlns:a14="http://schemas.microsoft.com/office/drawing/2010/main">
-                            <a:solidFill>
-                              <a:schemeClr val="accent1"/>
-                            </a:solidFill>
-                          </a14:hiddenFill>
-                        </a:ext>
-                        <a:ext uri="{91240B29-F687-4F45-9708-019B960494DF}">
-                          <a14:hiddenLine xmlns:a14="http://schemas.microsoft.com/office/drawing/2010/main" w="19050">
-                            <a:solidFill>
-                              <a:schemeClr val="tx1"/>
-                            </a:solidFill>
-                            <a:miter lim="800000"/>
-                            <a:headEnd/>
-                            <a:tailEnd/>
-                          </a14:hiddenLine>
-                        </a:ext>
-                        <a:ext uri="{AF507438-7753-43E0-B8FC-AC1667EBCBE1}">
-                          <a14:hiddenEffects xmlns:a14="http://schemas.microsoft.com/office/drawing/2010/main">
-                            <a:effectLst>
-                              <a:outerShdw dist="35921" dir="2700000" algn="ctr" rotWithShape="0">
-                                <a:schemeClr val="bg2"/>
-                              </a:outerShdw>
-                            </a:effectLst>
-                          </a14:hiddenEffects>
-                        </a:ext>
-                      </a:extLst>
                     </p:spPr>
                   </p:pic>
                 </p:oleObj>
@@ -14731,7 +14642,7 @@
 </p:sld>
 </file>
 
-<file path=ppt/slides/slide21.xml><?xml version="1.0" encoding="utf-8"?>
+<file path=ppt/slides/slide22.xml><?xml version="1.0" encoding="utf-8"?>
 <p:sld xmlns:a="http://schemas.openxmlformats.org/drawingml/2006/main" xmlns:r="http://schemas.openxmlformats.org/officeDocument/2006/relationships" xmlns:p="http://schemas.openxmlformats.org/presentationml/2006/main">
   <p:cSld>
     <p:spTree>
@@ -14814,7 +14725,7 @@
 </p:sld>
 </file>
 
-<file path=ppt/slides/slide22.xml><?xml version="1.0" encoding="utf-8"?>
+<file path=ppt/slides/slide23.xml><?xml version="1.0" encoding="utf-8"?>
 <p:sld xmlns:a="http://schemas.openxmlformats.org/drawingml/2006/main" xmlns:r="http://schemas.openxmlformats.org/officeDocument/2006/relationships" xmlns:p="http://schemas.openxmlformats.org/presentationml/2006/main">
   <p:cSld>
     <p:spTree>
@@ -18521,7 +18432,7 @@
 </p:sld>
 </file>
 
-<file path=ppt/slides/slide23.xml><?xml version="1.0" encoding="utf-8"?>
+<file path=ppt/slides/slide24.xml><?xml version="1.0" encoding="utf-8"?>
 <p:sld xmlns:a="http://schemas.openxmlformats.org/drawingml/2006/main" xmlns:r="http://schemas.openxmlformats.org/officeDocument/2006/relationships" xmlns:p="http://schemas.openxmlformats.org/presentationml/2006/main">
   <p:cSld>
     <p:spTree>
@@ -20212,7 +20123,7 @@
 </p:sld>
 </file>
 
-<file path=ppt/slides/slide24.xml><?xml version="1.0" encoding="utf-8"?>
+<file path=ppt/slides/slide25.xml><?xml version="1.0" encoding="utf-8"?>
 <p:sld xmlns:a="http://schemas.openxmlformats.org/drawingml/2006/main" xmlns:r="http://schemas.openxmlformats.org/officeDocument/2006/relationships" xmlns:p="http://schemas.openxmlformats.org/presentationml/2006/main">
   <p:cSld>
     <p:spTree>
@@ -21676,7 +21587,7 @@
 </p:sld>
 </file>
 
-<file path=ppt/slides/slide25.xml><?xml version="1.0" encoding="utf-8"?>
+<file path=ppt/slides/slide26.xml><?xml version="1.0" encoding="utf-8"?>
 <p:sld xmlns:a="http://schemas.openxmlformats.org/drawingml/2006/main" xmlns:r="http://schemas.openxmlformats.org/officeDocument/2006/relationships" xmlns:p="http://schemas.openxmlformats.org/presentationml/2006/main">
   <p:cSld>
     <p:spTree>
@@ -22440,7 +22351,7 @@
 </p:sld>
 </file>
 
-<file path=ppt/slides/slide26.xml><?xml version="1.0" encoding="utf-8"?>
+<file path=ppt/slides/slide27.xml><?xml version="1.0" encoding="utf-8"?>
 <p:sld xmlns:a="http://schemas.openxmlformats.org/drawingml/2006/main" xmlns:r="http://schemas.openxmlformats.org/officeDocument/2006/relationships" xmlns:p="http://schemas.openxmlformats.org/presentationml/2006/main">
   <p:cSld>
     <p:spTree>
@@ -23729,7 +23640,7 @@
 </p:sld>
 </file>
 
-<file path=ppt/slides/slide27.xml><?xml version="1.0" encoding="utf-8"?>
+<file path=ppt/slides/slide28.xml><?xml version="1.0" encoding="utf-8"?>
 <p:sld xmlns:a="http://schemas.openxmlformats.org/drawingml/2006/main" xmlns:r="http://schemas.openxmlformats.org/officeDocument/2006/relationships" xmlns:p="http://schemas.openxmlformats.org/presentationml/2006/main">
   <p:cSld>
     <p:spTree>

</xml_diff>